<commit_message>
finished up assignment 5
</commit_message>
<xml_diff>
--- a/Stylng with CSS.pptx
+++ b/Stylng with CSS.pptx
@@ -3613,7 +3613,11 @@
             </a:pPr>
             <a:r>
               <a:rPr lang="en-US" altLang="en-US" sz="2200" dirty="0" smtClean="0"/>
-              <a:t>Specifying style</a:t>
+              <a:t>Methods for specifying </a:t>
+            </a:r>
+            <a:r>
+              <a:rPr lang="en-US" altLang="en-US" sz="2200" dirty="0" smtClean="0"/>
+              <a:t>style</a:t>
             </a:r>
           </a:p>
           <a:p>
@@ -3818,7 +3822,9 @@
         </p:nvSpPr>
         <p:spPr/>
         <p:txBody>
-          <a:bodyPr/>
+          <a:bodyPr>
+            <a:normAutofit fontScale="92500" lnSpcReduction="20000"/>
+          </a:bodyPr>
           <a:lstStyle/>
           <a:p>
             <a:r>
@@ -3858,8 +3864,80 @@
             </a:pPr>
             <a:r>
               <a:rPr lang="en-US" dirty="0" smtClean="0"/>
+              <a:t>	</a:t>
+            </a:r>
+            <a:r>
+              <a:rPr lang="en-US" dirty="0" smtClean="0"/>
+              <a:t>}</a:t>
+            </a:r>
+          </a:p>
+          <a:p>
+            <a:pPr marL="365760" lvl="1" indent="0">
+              <a:buNone/>
+            </a:pPr>
+            <a:endParaRPr lang="en-US" dirty="0"/>
+          </a:p>
+          <a:p>
+            <a:pPr marL="365760" lvl="1" indent="0">
+              <a:buNone/>
+            </a:pPr>
+            <a:r>
+              <a:rPr lang="en-US" dirty="0" smtClean="0"/>
+              <a:t>As shown on slide 7, these items could also be styled this way:</a:t>
+            </a:r>
+          </a:p>
+          <a:p>
+            <a:pPr marL="45720" indent="0">
+              <a:buNone/>
+            </a:pPr>
+            <a:r>
+              <a:rPr lang="en-US" dirty="0" smtClean="0"/>
+              <a:t>	</a:t>
+            </a:r>
+            <a:r>
+              <a:rPr lang="en-US" dirty="0" err="1" smtClean="0"/>
+              <a:t>ul</a:t>
+            </a:r>
+            <a:r>
+              <a:rPr lang="en-US" dirty="0" smtClean="0"/>
+              <a:t> </a:t>
+            </a:r>
+            <a:r>
+              <a:rPr lang="en-US" dirty="0" err="1" smtClean="0"/>
+              <a:t>ol</a:t>
+            </a:r>
+            <a:r>
+              <a:rPr lang="en-US" dirty="0" smtClean="0"/>
+              <a:t> </a:t>
+            </a:r>
+            <a:r>
+              <a:rPr lang="en-US" dirty="0"/>
+              <a:t>li {</a:t>
+            </a:r>
+          </a:p>
+          <a:p>
+            <a:pPr marL="365760" lvl="1" indent="0">
+              <a:buNone/>
+            </a:pPr>
+            <a:r>
+              <a:rPr lang="en-US" dirty="0"/>
+              <a:t>	    color: pink;</a:t>
+            </a:r>
+          </a:p>
+          <a:p>
+            <a:pPr marL="365760" lvl="1" indent="0">
+              <a:buNone/>
+            </a:pPr>
+            <a:r>
+              <a:rPr lang="en-US" dirty="0"/>
               <a:t>	}</a:t>
             </a:r>
+          </a:p>
+          <a:p>
+            <a:pPr marL="365760" lvl="1" indent="0">
+              <a:buNone/>
+            </a:pPr>
+            <a:endParaRPr lang="en-US" dirty="0" smtClean="0"/>
           </a:p>
           <a:p>
             <a:pPr marL="365760" lvl="1" indent="0">
@@ -4587,12 +4665,8 @@
               <a:t>Anchor </a:t>
             </a:r>
             <a:r>
-              <a:rPr lang="en-US" dirty="0" err="1" smtClean="0"/>
-              <a:t>pseuduo</a:t>
-            </a:r>
-            <a:r>
-              <a:rPr lang="en-US" dirty="0" smtClean="0"/>
-              <a:t>-classes</a:t>
+              <a:rPr lang="en-US" dirty="0" smtClean="0"/>
+              <a:t>pseudo-classes</a:t>
             </a:r>
             <a:endParaRPr lang="en-US" dirty="0"/>
           </a:p>
@@ -5056,19 +5130,19 @@
             </a:br>
             <a:r>
               <a:rPr lang="en-US" dirty="0" smtClean="0"/>
-              <a:t>:last-</a:t>
-            </a:r>
-            <a:r>
-              <a:rPr lang="en-US" dirty="0" err="1" smtClean="0"/>
-              <a:t>chld</a:t>
-            </a:r>
-            <a:r>
-              <a:rPr lang="en-US" dirty="0" smtClean="0"/>
-              <a:t> and :last-of-</a:t>
-            </a:r>
-            <a:r>
-              <a:rPr lang="en-US" dirty="0" err="1" smtClean="0"/>
-              <a:t>otype</a:t>
+              <a:t>:</a:t>
+            </a:r>
+            <a:r>
+              <a:rPr lang="en-US" dirty="0" smtClean="0"/>
+              <a:t>last-child </a:t>
+            </a:r>
+            <a:r>
+              <a:rPr lang="en-US" dirty="0" smtClean="0"/>
+              <a:t>and :</a:t>
+            </a:r>
+            <a:r>
+              <a:rPr lang="en-US" dirty="0" smtClean="0"/>
+              <a:t>last-of-type</a:t>
             </a:r>
             <a:endParaRPr lang="en-US" dirty="0"/>
           </a:p>
@@ -5124,18 +5198,18 @@
         <p:spPr>
           <a:xfrm>
             <a:off x="380999" y="1828799"/>
-            <a:ext cx="8407893" cy="4297679"/>
+            <a:ext cx="8534401" cy="4800601"/>
           </a:xfrm>
         </p:spPr>
         <p:txBody>
           <a:bodyPr>
-            <a:normAutofit/>
+            <a:normAutofit fontScale="92500" lnSpcReduction="10000"/>
           </a:bodyPr>
           <a:lstStyle/>
           <a:p>
             <a:r>
               <a:rPr lang="en-US" sz="2400" dirty="0" smtClean="0"/>
-              <a:t>n-</a:t>
+              <a:t>:n-</a:t>
             </a:r>
             <a:r>
               <a:rPr lang="en-US" sz="2400" dirty="0" err="1" smtClean="0"/>
@@ -5193,35 +5267,99 @@
               <a:buNone/>
             </a:pPr>
             <a:r>
-              <a:rPr lang="en-US" sz="2400" dirty="0" smtClean="0"/>
-              <a:t>Selects every paragraph that is the second child of another element</a:t>
-            </a:r>
-            <a:br>
-              <a:rPr lang="en-US" sz="2400" dirty="0" smtClean="0"/>
-            </a:br>
-            <a:endParaRPr lang="en-US" sz="2400" dirty="0" smtClean="0"/>
-          </a:p>
-          <a:p>
-            <a:pPr marL="365760" lvl="1" indent="0">
-              <a:buNone/>
-            </a:pPr>
-            <a:r>
-              <a:rPr lang="en-US" sz="2400" i="1" dirty="0" smtClean="0"/>
+              <a:rPr lang="en-US" sz="2000" dirty="0" smtClean="0"/>
+              <a:t>Selects every paragraph that is the second child of another </a:t>
+            </a:r>
+            <a:r>
+              <a:rPr lang="en-US" sz="2000" dirty="0" smtClean="0"/>
+              <a:t>element.  </a:t>
+            </a:r>
+          </a:p>
+          <a:p>
+            <a:pPr>
+              <a:spcBef>
+                <a:spcPts val="1800"/>
+              </a:spcBef>
+            </a:pPr>
+            <a:r>
+              <a:rPr lang="en-US" sz="2200" dirty="0" smtClean="0"/>
+              <a:t>If using this for list items, keep in mind that the descendants of the specified item will also be styled.</a:t>
+            </a:r>
+          </a:p>
+          <a:p>
+            <a:pPr>
+              <a:spcBef>
+                <a:spcPts val="1800"/>
+              </a:spcBef>
+            </a:pPr>
+            <a:r>
+              <a:rPr lang="en-US" sz="2200" i="1" dirty="0" smtClean="0"/>
               <a:t>odd</a:t>
             </a:r>
             <a:r>
-              <a:rPr lang="en-US" sz="2400" dirty="0" smtClean="0"/>
-              <a:t> and </a:t>
-            </a:r>
-            <a:r>
-              <a:rPr lang="en-US" sz="2400" i="1" dirty="0" smtClean="0"/>
+              <a:rPr lang="en-US" sz="2200" dirty="0" smtClean="0"/>
+              <a:t> </a:t>
+            </a:r>
+            <a:r>
+              <a:rPr lang="en-US" sz="2200" dirty="0" smtClean="0"/>
+              <a:t>and </a:t>
+            </a:r>
+            <a:r>
+              <a:rPr lang="en-US" sz="2200" i="1" dirty="0" smtClean="0"/>
               <a:t>even</a:t>
             </a:r>
             <a:r>
-              <a:rPr lang="en-US" sz="2400" dirty="0" smtClean="0"/>
-              <a:t> may also be used as arguments</a:t>
-            </a:r>
-            <a:endParaRPr lang="en-US" sz="2400" dirty="0"/>
+              <a:rPr lang="en-US" sz="2200" dirty="0" smtClean="0"/>
+              <a:t> may also be used as </a:t>
+            </a:r>
+            <a:r>
+              <a:rPr lang="en-US" sz="2200" dirty="0" smtClean="0"/>
+              <a:t>arguments</a:t>
+            </a:r>
+          </a:p>
+          <a:p>
+            <a:pPr>
+              <a:spcBef>
+                <a:spcPts val="1800"/>
+              </a:spcBef>
+            </a:pPr>
+            <a:r>
+              <a:rPr lang="en-US" sz="2200" dirty="0" smtClean="0"/>
+              <a:t>arguments may be expressions:</a:t>
+            </a:r>
+          </a:p>
+          <a:p>
+            <a:pPr marL="640080" lvl="2" indent="0">
+              <a:spcBef>
+                <a:spcPts val="1200"/>
+              </a:spcBef>
+              <a:buNone/>
+            </a:pPr>
+            <a:r>
+              <a:rPr lang="en-US" sz="2200" dirty="0" smtClean="0"/>
+              <a:t>(3n) selects every third child</a:t>
+            </a:r>
+          </a:p>
+          <a:p>
+            <a:pPr marL="640080" lvl="2" indent="0">
+              <a:spcBef>
+                <a:spcPts val="1200"/>
+              </a:spcBef>
+              <a:buNone/>
+            </a:pPr>
+            <a:r>
+              <a:rPr lang="en-US" sz="2200" dirty="0" smtClean="0"/>
+              <a:t>(3n+2) selects every third child beginning with the 2</a:t>
+            </a:r>
+            <a:r>
+              <a:rPr lang="en-US" sz="2200" baseline="30000" dirty="0" smtClean="0"/>
+              <a:t>nd</a:t>
+            </a:r>
+            <a:r>
+              <a:rPr lang="en-US" sz="2200" dirty="0" smtClean="0"/>
+              <a:t> one</a:t>
+            </a:r>
+            <a:endParaRPr lang="en-US" sz="2200" dirty="0"/>
           </a:p>
         </p:txBody>
       </p:sp>
@@ -5242,11 +5380,7 @@
           <a:p>
             <a:r>
               <a:rPr lang="en-US" dirty="0" smtClean="0"/>
-              <a:t>:</a:t>
-            </a:r>
-            <a:r>
-              <a:rPr lang="en-US" dirty="0" smtClean="0"/>
-              <a:t>nth-child </a:t>
+              <a:t>:nth-child </a:t>
             </a:r>
             <a:endParaRPr lang="en-US" dirty="0"/>
           </a:p>
@@ -5352,7 +5486,19 @@
             </a:pPr>
             <a:r>
               <a:rPr lang="en-US" sz="1800" dirty="0" smtClean="0"/>
-              <a:t>                Enlarges the first letter of the first paragraph in main.</a:t>
+              <a:t>                </a:t>
+            </a:r>
+            <a:r>
+              <a:rPr lang="en-US" sz="1800" dirty="0"/>
+              <a:t>E</a:t>
+            </a:r>
+            <a:r>
+              <a:rPr lang="en-US" sz="1800" dirty="0" smtClean="0"/>
+              <a:t>nlarges </a:t>
+            </a:r>
+            <a:r>
+              <a:rPr lang="en-US" sz="1800" dirty="0" smtClean="0"/>
+              <a:t>the first letter of the first paragraph in main.</a:t>
             </a:r>
           </a:p>
           <a:p>
@@ -8687,9 +8833,14 @@
               <a:t>	   &lt;</a:t>
             </a:r>
             <a:r>
-              <a:rPr lang="it-IT" sz="1900" dirty="0"/>
-              <a:t>ol&gt;</a:t>
-            </a:r>
+              <a:rPr lang="it-IT" sz="1900" dirty="0" smtClean="0"/>
+              <a:t>ol class=</a:t>
+            </a:r>
+            <a:r>
+              <a:rPr lang="en-US" sz="2000" dirty="0" smtClean="0"/>
+              <a:t>“inner”&gt;</a:t>
+            </a:r>
+            <a:endParaRPr lang="it-IT" sz="1900" dirty="0"/>
           </a:p>
           <a:p>
             <a:pPr marL="320040" lvl="1" indent="0">

</xml_diff>